<commit_message>
Corrección PCB test, diseño preliminar poncho
</commit_message>
<xml_diff>
--- a/proteus/placa_text.pptx
+++ b/proteus/placa_text.pptx
@@ -288,7 +288,7 @@
           <a:p>
             <a:fld id="{491D21B5-2E6D-497E-862F-D64FC10119C2}" type="datetimeFigureOut">
               <a:rPr lang="es-ES" smtClean="0"/>
-              <a:t>30/10/2022</a:t>
+              <a:t>31/10/2022</a:t>
             </a:fld>
             <a:endParaRPr lang="es-ES"/>
           </a:p>
@@ -458,7 +458,7 @@
           <a:p>
             <a:fld id="{491D21B5-2E6D-497E-862F-D64FC10119C2}" type="datetimeFigureOut">
               <a:rPr lang="es-ES" smtClean="0"/>
-              <a:t>30/10/2022</a:t>
+              <a:t>31/10/2022</a:t>
             </a:fld>
             <a:endParaRPr lang="es-ES"/>
           </a:p>
@@ -638,7 +638,7 @@
           <a:p>
             <a:fld id="{491D21B5-2E6D-497E-862F-D64FC10119C2}" type="datetimeFigureOut">
               <a:rPr lang="es-ES" smtClean="0"/>
-              <a:t>30/10/2022</a:t>
+              <a:t>31/10/2022</a:t>
             </a:fld>
             <a:endParaRPr lang="es-ES"/>
           </a:p>
@@ -808,7 +808,7 @@
           <a:p>
             <a:fld id="{491D21B5-2E6D-497E-862F-D64FC10119C2}" type="datetimeFigureOut">
               <a:rPr lang="es-ES" smtClean="0"/>
-              <a:t>30/10/2022</a:t>
+              <a:t>31/10/2022</a:t>
             </a:fld>
             <a:endParaRPr lang="es-ES"/>
           </a:p>
@@ -1054,7 +1054,7 @@
           <a:p>
             <a:fld id="{491D21B5-2E6D-497E-862F-D64FC10119C2}" type="datetimeFigureOut">
               <a:rPr lang="es-ES" smtClean="0"/>
-              <a:t>30/10/2022</a:t>
+              <a:t>31/10/2022</a:t>
             </a:fld>
             <a:endParaRPr lang="es-ES"/>
           </a:p>
@@ -1342,7 +1342,7 @@
           <a:p>
             <a:fld id="{491D21B5-2E6D-497E-862F-D64FC10119C2}" type="datetimeFigureOut">
               <a:rPr lang="es-ES" smtClean="0"/>
-              <a:t>30/10/2022</a:t>
+              <a:t>31/10/2022</a:t>
             </a:fld>
             <a:endParaRPr lang="es-ES"/>
           </a:p>
@@ -1764,7 +1764,7 @@
           <a:p>
             <a:fld id="{491D21B5-2E6D-497E-862F-D64FC10119C2}" type="datetimeFigureOut">
               <a:rPr lang="es-ES" smtClean="0"/>
-              <a:t>30/10/2022</a:t>
+              <a:t>31/10/2022</a:t>
             </a:fld>
             <a:endParaRPr lang="es-ES"/>
           </a:p>
@@ -1882,7 +1882,7 @@
           <a:p>
             <a:fld id="{491D21B5-2E6D-497E-862F-D64FC10119C2}" type="datetimeFigureOut">
               <a:rPr lang="es-ES" smtClean="0"/>
-              <a:t>30/10/2022</a:t>
+              <a:t>31/10/2022</a:t>
             </a:fld>
             <a:endParaRPr lang="es-ES"/>
           </a:p>
@@ -1977,7 +1977,7 @@
           <a:p>
             <a:fld id="{491D21B5-2E6D-497E-862F-D64FC10119C2}" type="datetimeFigureOut">
               <a:rPr lang="es-ES" smtClean="0"/>
-              <a:t>30/10/2022</a:t>
+              <a:t>31/10/2022</a:t>
             </a:fld>
             <a:endParaRPr lang="es-ES"/>
           </a:p>
@@ -2254,7 +2254,7 @@
           <a:p>
             <a:fld id="{491D21B5-2E6D-497E-862F-D64FC10119C2}" type="datetimeFigureOut">
               <a:rPr lang="es-ES" smtClean="0"/>
-              <a:t>30/10/2022</a:t>
+              <a:t>31/10/2022</a:t>
             </a:fld>
             <a:endParaRPr lang="es-ES"/>
           </a:p>
@@ -2507,7 +2507,7 @@
           <a:p>
             <a:fld id="{491D21B5-2E6D-497E-862F-D64FC10119C2}" type="datetimeFigureOut">
               <a:rPr lang="es-ES" smtClean="0"/>
-              <a:t>30/10/2022</a:t>
+              <a:t>31/10/2022</a:t>
             </a:fld>
             <a:endParaRPr lang="es-ES"/>
           </a:p>
@@ -2720,7 +2720,7 @@
           <a:p>
             <a:fld id="{491D21B5-2E6D-497E-862F-D64FC10119C2}" type="datetimeFigureOut">
               <a:rPr lang="es-ES" smtClean="0"/>
-              <a:t>30/10/2022</a:t>
+              <a:t>31/10/2022</a:t>
             </a:fld>
             <a:endParaRPr lang="es-ES"/>
           </a:p>
@@ -3135,7 +3135,7 @@
         </p:nvCxnSpPr>
         <p:spPr>
           <a:xfrm flipH="1">
-            <a:off x="251520" y="1412776"/>
+            <a:off x="-252536" y="1412776"/>
             <a:ext cx="8640960" cy="0"/>
           </a:xfrm>
           <a:prstGeom prst="line">
@@ -3170,7 +3170,7 @@
         </p:nvSpPr>
         <p:spPr>
           <a:xfrm>
-            <a:off x="683568" y="2502109"/>
+            <a:off x="179512" y="2502109"/>
             <a:ext cx="4536504" cy="2520280"/>
           </a:xfrm>
           <a:prstGeom prst="rect">
@@ -3216,7 +3216,7 @@
         </p:nvSpPr>
         <p:spPr>
           <a:xfrm>
-            <a:off x="899592" y="4230301"/>
+            <a:off x="395536" y="4230301"/>
             <a:ext cx="648072" cy="648072"/>
           </a:xfrm>
           <a:prstGeom prst="rect">
@@ -3262,7 +3262,7 @@
         </p:nvSpPr>
         <p:spPr>
           <a:xfrm>
-            <a:off x="1763688" y="4230301"/>
+            <a:off x="1259632" y="4230301"/>
             <a:ext cx="648072" cy="648072"/>
           </a:xfrm>
           <a:prstGeom prst="rect">
@@ -3308,7 +3308,7 @@
         </p:nvSpPr>
         <p:spPr>
           <a:xfrm>
-            <a:off x="2627784" y="4230301"/>
+            <a:off x="2123728" y="4230301"/>
             <a:ext cx="648072" cy="648072"/>
           </a:xfrm>
           <a:prstGeom prst="rect">
@@ -3354,7 +3354,7 @@
         </p:nvSpPr>
         <p:spPr>
           <a:xfrm>
-            <a:off x="3491880" y="4230301"/>
+            <a:off x="2987824" y="4230301"/>
             <a:ext cx="648072" cy="648072"/>
           </a:xfrm>
           <a:prstGeom prst="rect">
@@ -3400,7 +3400,7 @@
         </p:nvSpPr>
         <p:spPr>
           <a:xfrm>
-            <a:off x="4355976" y="4230301"/>
+            <a:off x="3851920" y="4230301"/>
             <a:ext cx="648072" cy="648072"/>
           </a:xfrm>
           <a:prstGeom prst="rect">
@@ -3446,7 +3446,7 @@
         </p:nvSpPr>
         <p:spPr>
           <a:xfrm>
-            <a:off x="899592" y="2718133"/>
+            <a:off x="395536" y="2718133"/>
             <a:ext cx="1728192" cy="324036"/>
           </a:xfrm>
           <a:prstGeom prst="rect">
@@ -3492,7 +3492,7 @@
         </p:nvSpPr>
         <p:spPr>
           <a:xfrm>
-            <a:off x="2888910" y="2718133"/>
+            <a:off x="2384854" y="2718133"/>
             <a:ext cx="864096" cy="162018"/>
           </a:xfrm>
           <a:prstGeom prst="rect">
@@ -3538,7 +3538,7 @@
         </p:nvSpPr>
         <p:spPr>
           <a:xfrm>
-            <a:off x="2888910" y="2880151"/>
+            <a:off x="2384854" y="2880151"/>
             <a:ext cx="864096" cy="162018"/>
           </a:xfrm>
           <a:prstGeom prst="rect">
@@ -3584,7 +3584,7 @@
         </p:nvSpPr>
         <p:spPr>
           <a:xfrm>
-            <a:off x="4139952" y="3063843"/>
+            <a:off x="3635896" y="3063843"/>
             <a:ext cx="432048" cy="162018"/>
           </a:xfrm>
           <a:prstGeom prst="rect">
@@ -3630,7 +3630,7 @@
         </p:nvSpPr>
         <p:spPr>
           <a:xfrm rot="5400000">
-            <a:off x="4735854" y="3413046"/>
+            <a:off x="4231798" y="3413046"/>
             <a:ext cx="536388" cy="162018"/>
           </a:xfrm>
           <a:prstGeom prst="rect">
@@ -3683,7 +3683,7 @@
         </p:nvSpPr>
         <p:spPr>
           <a:xfrm>
-            <a:off x="589616" y="5932158"/>
+            <a:off x="85560" y="5932158"/>
             <a:ext cx="1266565" cy="369332"/>
           </a:xfrm>
           <a:prstGeom prst="rect">
@@ -3713,7 +3713,7 @@
         </p:nvSpPr>
         <p:spPr>
           <a:xfrm>
-            <a:off x="1380776" y="5716134"/>
+            <a:off x="876720" y="5716134"/>
             <a:ext cx="1412438" cy="369332"/>
           </a:xfrm>
           <a:prstGeom prst="rect">
@@ -3743,7 +3743,7 @@
         </p:nvSpPr>
         <p:spPr>
           <a:xfrm>
-            <a:off x="2285684" y="5500110"/>
+            <a:off x="1781628" y="5500110"/>
             <a:ext cx="1330814" cy="369332"/>
           </a:xfrm>
           <a:prstGeom prst="rect">
@@ -3773,7 +3773,7 @@
         </p:nvSpPr>
         <p:spPr>
           <a:xfrm>
-            <a:off x="3120189" y="5284086"/>
+            <a:off x="2616133" y="5284086"/>
             <a:ext cx="1389996" cy="369332"/>
           </a:xfrm>
           <a:prstGeom prst="rect">
@@ -3803,7 +3803,7 @@
         </p:nvSpPr>
         <p:spPr>
           <a:xfrm>
-            <a:off x="4284783" y="5130778"/>
+            <a:off x="3780727" y="5130778"/>
             <a:ext cx="788999" cy="369332"/>
           </a:xfrm>
           <a:prstGeom prst="rect">
@@ -3836,7 +3836,7 @@
         </p:nvCxnSpPr>
         <p:spPr>
           <a:xfrm rot="5400000" flipH="1" flipV="1">
-            <a:off x="696371" y="5404902"/>
+            <a:off x="192315" y="5404902"/>
             <a:ext cx="1053785" cy="729"/>
           </a:xfrm>
           <a:prstGeom prst="bentConnector3">
@@ -3874,7 +3874,7 @@
         </p:nvCxnSpPr>
         <p:spPr>
           <a:xfrm rot="5400000" flipH="1" flipV="1">
-            <a:off x="1668479" y="5296890"/>
+            <a:off x="1164423" y="5296890"/>
             <a:ext cx="837761" cy="729"/>
           </a:xfrm>
           <a:prstGeom prst="bentConnector3">
@@ -3912,7 +3912,7 @@
         </p:nvCxnSpPr>
         <p:spPr>
           <a:xfrm rot="5400000" flipH="1" flipV="1">
-            <a:off x="2640587" y="5188878"/>
+            <a:off x="2136531" y="5188878"/>
             <a:ext cx="621737" cy="729"/>
           </a:xfrm>
           <a:prstGeom prst="bentConnector3">
@@ -3950,7 +3950,7 @@
         </p:nvCxnSpPr>
         <p:spPr>
           <a:xfrm rot="5400000" flipH="1" flipV="1">
-            <a:off x="3612695" y="5080866"/>
+            <a:off x="3108639" y="5080866"/>
             <a:ext cx="405713" cy="729"/>
           </a:xfrm>
           <a:prstGeom prst="bentConnector3">
@@ -3988,7 +3988,7 @@
         </p:nvCxnSpPr>
         <p:spPr>
           <a:xfrm rot="5400000" flipH="1" flipV="1">
-            <a:off x="4553445" y="5004212"/>
+            <a:off x="4049389" y="5004212"/>
             <a:ext cx="252405" cy="729"/>
           </a:xfrm>
           <a:prstGeom prst="bentConnector3">
@@ -4023,7 +4023,7 @@
         </p:nvSpPr>
         <p:spPr>
           <a:xfrm>
-            <a:off x="970872" y="4302309"/>
+            <a:off x="466816" y="4302309"/>
             <a:ext cx="481184" cy="477721"/>
           </a:xfrm>
           <a:prstGeom prst="ellipse">
@@ -4063,7 +4063,7 @@
         </p:nvSpPr>
         <p:spPr>
           <a:xfrm>
-            <a:off x="1856181" y="4302309"/>
+            <a:off x="1352125" y="4302309"/>
             <a:ext cx="481184" cy="477721"/>
           </a:xfrm>
           <a:prstGeom prst="ellipse">
@@ -4103,7 +4103,7 @@
         </p:nvSpPr>
         <p:spPr>
           <a:xfrm>
-            <a:off x="2710498" y="4302309"/>
+            <a:off x="2206442" y="4302309"/>
             <a:ext cx="481184" cy="477721"/>
           </a:xfrm>
           <a:prstGeom prst="ellipse">
@@ -4143,7 +4143,7 @@
         </p:nvSpPr>
         <p:spPr>
           <a:xfrm>
-            <a:off x="3574595" y="4302309"/>
+            <a:off x="3070539" y="4302309"/>
             <a:ext cx="481184" cy="477721"/>
           </a:xfrm>
           <a:prstGeom prst="ellipse">
@@ -4183,7 +4183,7 @@
         </p:nvSpPr>
         <p:spPr>
           <a:xfrm>
-            <a:off x="4438690" y="4302309"/>
+            <a:off x="3934634" y="4302309"/>
             <a:ext cx="481184" cy="477721"/>
           </a:xfrm>
           <a:prstGeom prst="ellipse">
@@ -4223,7 +4223,7 @@
         </p:nvSpPr>
         <p:spPr>
           <a:xfrm>
-            <a:off x="3949338" y="2694511"/>
+            <a:off x="3445282" y="2694511"/>
             <a:ext cx="301686" cy="369332"/>
           </a:xfrm>
           <a:prstGeom prst="rect">
@@ -4253,7 +4253,7 @@
         </p:nvSpPr>
         <p:spPr>
           <a:xfrm>
-            <a:off x="4438690" y="2694511"/>
+            <a:off x="3934634" y="2694511"/>
             <a:ext cx="301686" cy="369332"/>
           </a:xfrm>
           <a:prstGeom prst="rect">
@@ -4282,7 +4282,7 @@
         </p:nvSpPr>
         <p:spPr>
           <a:xfrm>
-            <a:off x="4853205" y="2863290"/>
+            <a:off x="4349149" y="2863290"/>
             <a:ext cx="301686" cy="369332"/>
           </a:xfrm>
           <a:prstGeom prst="rect">
@@ -4312,7 +4312,7 @@
         </p:nvSpPr>
         <p:spPr>
           <a:xfrm>
-            <a:off x="4853205" y="3762249"/>
+            <a:off x="4349149" y="3762249"/>
             <a:ext cx="301686" cy="369332"/>
           </a:xfrm>
           <a:prstGeom prst="rect">
@@ -4341,7 +4341,7 @@
         </p:nvSpPr>
         <p:spPr>
           <a:xfrm>
-            <a:off x="3597647" y="2195572"/>
+            <a:off x="3093591" y="2195572"/>
             <a:ext cx="301686" cy="369332"/>
           </a:xfrm>
           <a:prstGeom prst="rect">
@@ -4371,7 +4371,7 @@
         </p:nvSpPr>
         <p:spPr>
           <a:xfrm>
-            <a:off x="2710498" y="2195572"/>
+            <a:off x="2206442" y="2195572"/>
             <a:ext cx="301686" cy="369332"/>
           </a:xfrm>
           <a:prstGeom prst="rect">
@@ -4400,8 +4400,8 @@
         </p:nvSpPr>
         <p:spPr>
           <a:xfrm>
-            <a:off x="3597647" y="3047956"/>
-            <a:ext cx="301686" cy="369332"/>
+            <a:off x="2997328" y="3047956"/>
+            <a:ext cx="418704" cy="369332"/>
           </a:xfrm>
           <a:prstGeom prst="rect">
             <a:avLst/>
@@ -4416,7 +4416,7 @@
           <a:p>
             <a:r>
               <a:rPr lang="es-ES" dirty="0" smtClean="0"/>
-              <a:t>8</a:t>
+              <a:t>14</a:t>
             </a:r>
             <a:endParaRPr lang="es-ES" dirty="0"/>
           </a:p>
@@ -4430,8 +4430,8 @@
         </p:nvSpPr>
         <p:spPr>
           <a:xfrm>
-            <a:off x="2651989" y="3047956"/>
-            <a:ext cx="418704" cy="369332"/>
+            <a:off x="2165906" y="3047956"/>
+            <a:ext cx="301686" cy="369332"/>
           </a:xfrm>
           <a:prstGeom prst="rect">
             <a:avLst/>
@@ -4446,7 +4446,7 @@
           <a:p>
             <a:r>
               <a:rPr lang="es-ES" dirty="0" smtClean="0"/>
-              <a:t>14</a:t>
+              <a:t>8</a:t>
             </a:r>
             <a:endParaRPr lang="es-ES" dirty="0"/>
           </a:p>
@@ -4461,14 +4461,14 @@
           <p:nvPr>
             <p:extLst>
               <p:ext uri="{D42A27DB-BD31-4B8C-83A1-F6EECF244321}">
-                <p14:modId xmlns:p14="http://schemas.microsoft.com/office/powerpoint/2010/main" val="935507702"/>
+                <p14:modId xmlns:p14="http://schemas.microsoft.com/office/powerpoint/2010/main" val="2151227145"/>
               </p:ext>
             </p:extLst>
           </p:nvPr>
         </p:nvGraphicFramePr>
         <p:xfrm>
-          <a:off x="7308432" y="1956372"/>
-          <a:ext cx="1152000" cy="4114800"/>
+          <a:off x="6444336" y="1956372"/>
+          <a:ext cx="2510739" cy="4114800"/>
         </p:xfrm>
         <a:graphic>
           <a:graphicData uri="http://schemas.openxmlformats.org/drawingml/2006/table">
@@ -4477,11 +4477,12 @@
                 <a:tableStyleId>{5C22544A-7EE6-4342-B048-85BDC9FD1C3A}</a:tableStyleId>
               </a:tblPr>
               <a:tblGrid>
-                <a:gridCol w="360000"/>
-                <a:gridCol w="792000"/>
+                <a:gridCol w="413356"/>
+                <a:gridCol w="909383"/>
+                <a:gridCol w="1188000"/>
               </a:tblGrid>
               <a:tr h="216000">
-                <a:tc gridSpan="2">
+                <a:tc gridSpan="3">
                   <a:txBody>
                     <a:bodyPr/>
                     <a:lstStyle/>
@@ -4505,6 +4506,17 @@
                     </a:p>
                   </a:txBody>
                   <a:tcPr/>
+                </a:tc>
+                <a:tc hMerge="1">
+                  <a:txBody>
+                    <a:bodyPr/>
+                    <a:lstStyle/>
+                    <a:p>
+                      <a:pPr algn="ctr"/>
+                      <a:endParaRPr lang="es-ES" sz="1200" dirty="0"/>
+                    </a:p>
+                  </a:txBody>
+                  <a:tcPr anchor="ctr"/>
                 </a:tc>
               </a:tr>
               <a:tr h="216000">
@@ -4538,6 +4550,21 @@
                   </a:txBody>
                   <a:tcPr anchor="ctr"/>
                 </a:tc>
+                <a:tc>
+                  <a:txBody>
+                    <a:bodyPr/>
+                    <a:lstStyle/>
+                    <a:p>
+                      <a:pPr algn="ctr"/>
+                      <a:r>
+                        <a:rPr lang="es-ES" sz="1200" dirty="0" smtClean="0"/>
+                        <a:t>MODE_TOGGLE</a:t>
+                      </a:r>
+                      <a:endParaRPr lang="es-ES" sz="1200" dirty="0"/>
+                    </a:p>
+                  </a:txBody>
+                  <a:tcPr anchor="ctr"/>
+                </a:tc>
               </a:tr>
               <a:tr h="216000">
                 <a:tc>
@@ -4570,6 +4597,21 @@
                   </a:txBody>
                   <a:tcPr anchor="ctr"/>
                 </a:tc>
+                <a:tc>
+                  <a:txBody>
+                    <a:bodyPr/>
+                    <a:lstStyle/>
+                    <a:p>
+                      <a:pPr algn="ctr"/>
+                      <a:r>
+                        <a:rPr lang="es-ES" sz="1200" dirty="0" smtClean="0"/>
+                        <a:t>MODE_STAT</a:t>
+                      </a:r>
+                      <a:endParaRPr lang="es-ES" sz="1200" dirty="0"/>
+                    </a:p>
+                  </a:txBody>
+                  <a:tcPr anchor="ctr"/>
+                </a:tc>
               </a:tr>
               <a:tr h="216000">
                 <a:tc>
@@ -4602,6 +4644,21 @@
                   </a:txBody>
                   <a:tcPr anchor="ctr"/>
                 </a:tc>
+                <a:tc>
+                  <a:txBody>
+                    <a:bodyPr/>
+                    <a:lstStyle/>
+                    <a:p>
+                      <a:pPr algn="ctr"/>
+                      <a:r>
+                        <a:rPr lang="es-ES" sz="1200" dirty="0" smtClean="0"/>
+                        <a:t>PIR_ENABLE</a:t>
+                      </a:r>
+                      <a:endParaRPr lang="es-ES" sz="1200" dirty="0"/>
+                    </a:p>
+                  </a:txBody>
+                  <a:tcPr anchor="ctr"/>
+                </a:tc>
               </a:tr>
               <a:tr h="216000">
                 <a:tc>
@@ -4634,6 +4691,21 @@
                   </a:txBody>
                   <a:tcPr anchor="ctr"/>
                 </a:tc>
+                <a:tc>
+                  <a:txBody>
+                    <a:bodyPr/>
+                    <a:lstStyle/>
+                    <a:p>
+                      <a:pPr algn="ctr"/>
+                      <a:r>
+                        <a:rPr lang="es-ES" sz="1200" dirty="0" smtClean="0"/>
+                        <a:t>PIR_STAT</a:t>
+                      </a:r>
+                      <a:endParaRPr lang="es-ES" sz="1200" dirty="0"/>
+                    </a:p>
+                  </a:txBody>
+                  <a:tcPr anchor="ctr"/>
+                </a:tc>
               </a:tr>
               <a:tr h="216000">
                 <a:tc>
@@ -4666,6 +4738,21 @@
                   </a:txBody>
                   <a:tcPr anchor="ctr"/>
                 </a:tc>
+                <a:tc>
+                  <a:txBody>
+                    <a:bodyPr/>
+                    <a:lstStyle/>
+                    <a:p>
+                      <a:pPr algn="ctr"/>
+                      <a:r>
+                        <a:rPr lang="es-ES" sz="1200" dirty="0" smtClean="0"/>
+                        <a:t>LUX_STAT</a:t>
+                      </a:r>
+                      <a:endParaRPr lang="es-ES" sz="1200" dirty="0"/>
+                    </a:p>
+                  </a:txBody>
+                  <a:tcPr anchor="ctr"/>
+                </a:tc>
               </a:tr>
               <a:tr h="216000">
                 <a:tc>
@@ -4698,6 +4785,21 @@
                   </a:txBody>
                   <a:tcPr anchor="ctr"/>
                 </a:tc>
+                <a:tc>
+                  <a:txBody>
+                    <a:bodyPr/>
+                    <a:lstStyle/>
+                    <a:p>
+                      <a:pPr algn="ctr"/>
+                      <a:r>
+                        <a:rPr lang="es-ES" sz="1200" dirty="0" smtClean="0"/>
+                        <a:t>LUX_ENABLE</a:t>
+                      </a:r>
+                      <a:endParaRPr lang="es-ES" sz="1200" dirty="0"/>
+                    </a:p>
+                  </a:txBody>
+                  <a:tcPr anchor="ctr"/>
+                </a:tc>
               </a:tr>
               <a:tr h="216000">
                 <a:tc>
@@ -4730,6 +4832,21 @@
                   </a:txBody>
                   <a:tcPr anchor="ctr"/>
                 </a:tc>
+                <a:tc>
+                  <a:txBody>
+                    <a:bodyPr/>
+                    <a:lstStyle/>
+                    <a:p>
+                      <a:pPr algn="ctr"/>
+                      <a:r>
+                        <a:rPr lang="es-ES" sz="1200" dirty="0" smtClean="0"/>
+                        <a:t>LED_OUT</a:t>
+                      </a:r>
+                      <a:endParaRPr lang="es-ES" sz="1200" dirty="0"/>
+                    </a:p>
+                  </a:txBody>
+                  <a:tcPr anchor="ctr"/>
+                </a:tc>
               </a:tr>
               <a:tr h="216000">
                 <a:tc>
@@ -4762,6 +4879,21 @@
                   </a:txBody>
                   <a:tcPr anchor="ctr"/>
                 </a:tc>
+                <a:tc>
+                  <a:txBody>
+                    <a:bodyPr/>
+                    <a:lstStyle/>
+                    <a:p>
+                      <a:pPr algn="ctr"/>
+                      <a:r>
+                        <a:rPr lang="es-ES" sz="1200" dirty="0" smtClean="0"/>
+                        <a:t>RELAY_OUT</a:t>
+                      </a:r>
+                      <a:endParaRPr lang="es-ES" sz="1200" dirty="0"/>
+                    </a:p>
+                  </a:txBody>
+                  <a:tcPr anchor="ctr"/>
+                </a:tc>
               </a:tr>
               <a:tr h="216000">
                 <a:tc>
@@ -4794,6 +4926,21 @@
                   </a:txBody>
                   <a:tcPr anchor="ctr"/>
                 </a:tc>
+                <a:tc>
+                  <a:txBody>
+                    <a:bodyPr/>
+                    <a:lstStyle/>
+                    <a:p>
+                      <a:pPr algn="ctr"/>
+                      <a:r>
+                        <a:rPr lang="es-ES" sz="1200" dirty="0" smtClean="0"/>
+                        <a:t>TOGGLE</a:t>
+                      </a:r>
+                      <a:endParaRPr lang="es-ES" sz="1200" dirty="0"/>
+                    </a:p>
+                  </a:txBody>
+                  <a:tcPr anchor="ctr"/>
+                </a:tc>
               </a:tr>
               <a:tr h="216000">
                 <a:tc>
@@ -4826,6 +4973,68 @@
                   </a:txBody>
                   <a:tcPr anchor="ctr"/>
                 </a:tc>
+                <a:tc>
+                  <a:txBody>
+                    <a:bodyPr/>
+                    <a:lstStyle/>
+                    <a:p>
+                      <a:pPr algn="ctr"/>
+                      <a:r>
+                        <a:rPr lang="es-ES" sz="1200" dirty="0" smtClean="0"/>
+                        <a:t>PIR_IN</a:t>
+                      </a:r>
+                      <a:endParaRPr lang="es-ES" sz="1200" dirty="0"/>
+                    </a:p>
+                  </a:txBody>
+                  <a:tcPr anchor="ctr"/>
+                </a:tc>
+              </a:tr>
+              <a:tr h="252000">
+                <a:tc>
+                  <a:txBody>
+                    <a:bodyPr/>
+                    <a:lstStyle/>
+                    <a:p>
+                      <a:pPr algn="ctr"/>
+                      <a:r>
+                        <a:rPr lang="es-ES" sz="1200" dirty="0" smtClean="0"/>
+                        <a:t>11</a:t>
+                      </a:r>
+                      <a:endParaRPr lang="es-ES" sz="1200" dirty="0"/>
+                    </a:p>
+                  </a:txBody>
+                  <a:tcPr anchor="ctr"/>
+                </a:tc>
+                <a:tc>
+                  <a:txBody>
+                    <a:bodyPr/>
+                    <a:lstStyle/>
+                    <a:p>
+                      <a:pPr algn="ctr"/>
+                      <a:r>
+                        <a:rPr lang="es-ES" sz="1200" dirty="0" smtClean="0"/>
+                        <a:t>GPIO6</a:t>
+                      </a:r>
+                      <a:endParaRPr lang="es-ES" sz="1200" dirty="0"/>
+                    </a:p>
+                  </a:txBody>
+                  <a:tcPr anchor="ctr"/>
+                </a:tc>
+                <a:tc>
+                  <a:txBody>
+                    <a:bodyPr/>
+                    <a:lstStyle/>
+                    <a:p>
+                      <a:pPr algn="ctr"/>
+                      <a:r>
+                        <a:rPr lang="es-ES" sz="1200" dirty="0" smtClean="0"/>
+                        <a:t>LED_TOGGLE</a:t>
+                      </a:r>
+                      <a:endParaRPr lang="es-ES" sz="1200" dirty="0"/>
+                    </a:p>
+                  </a:txBody>
+                  <a:tcPr anchor="ctr"/>
+                </a:tc>
               </a:tr>
               <a:tr h="216000">
                 <a:tc>
@@ -4836,23 +5045,34 @@
                       <a:pPr algn="ctr"/>
                       <a:r>
                         <a:rPr lang="es-ES" sz="1200" dirty="0" smtClean="0"/>
-                        <a:t>11</a:t>
-                      </a:r>
-                      <a:endParaRPr lang="es-ES" sz="1200" dirty="0"/>
-                    </a:p>
-                  </a:txBody>
-                  <a:tcPr anchor="ctr"/>
-                </a:tc>
-                <a:tc>
-                  <a:txBody>
-                    <a:bodyPr/>
-                    <a:lstStyle/>
-                    <a:p>
-                      <a:pPr algn="ctr"/>
-                      <a:r>
-                        <a:rPr lang="es-ES" sz="1200" dirty="0" smtClean="0"/>
-                        <a:t>GPIO6</a:t>
-                      </a:r>
+                        <a:t>12</a:t>
+                      </a:r>
+                      <a:endParaRPr lang="es-ES" sz="1200" dirty="0"/>
+                    </a:p>
+                  </a:txBody>
+                  <a:tcPr anchor="ctr"/>
+                </a:tc>
+                <a:tc gridSpan="2">
+                  <a:txBody>
+                    <a:bodyPr/>
+                    <a:lstStyle/>
+                    <a:p>
+                      <a:pPr algn="ctr"/>
+                      <a:r>
+                        <a:rPr lang="es-ES" sz="1200" dirty="0" smtClean="0"/>
+                        <a:t>+3,3V</a:t>
+                      </a:r>
+                      <a:endParaRPr lang="es-ES" sz="1200" dirty="0"/>
+                    </a:p>
+                  </a:txBody>
+                  <a:tcPr anchor="ctr"/>
+                </a:tc>
+                <a:tc hMerge="1">
+                  <a:txBody>
+                    <a:bodyPr/>
+                    <a:lstStyle/>
+                    <a:p>
+                      <a:pPr algn="ctr"/>
                       <a:endParaRPr lang="es-ES" sz="1200" dirty="0"/>
                     </a:p>
                   </a:txBody>
@@ -4868,23 +5088,34 @@
                       <a:pPr algn="ctr"/>
                       <a:r>
                         <a:rPr lang="es-ES" sz="1200" dirty="0" smtClean="0"/>
-                        <a:t>12</a:t>
-                      </a:r>
-                      <a:endParaRPr lang="es-ES" sz="1200" dirty="0"/>
-                    </a:p>
-                  </a:txBody>
-                  <a:tcPr anchor="ctr"/>
-                </a:tc>
-                <a:tc>
-                  <a:txBody>
-                    <a:bodyPr/>
-                    <a:lstStyle/>
-                    <a:p>
-                      <a:pPr algn="ctr"/>
-                      <a:r>
-                        <a:rPr lang="es-ES" sz="1200" dirty="0" smtClean="0"/>
-                        <a:t>+3,3V</a:t>
-                      </a:r>
+                        <a:t>13</a:t>
+                      </a:r>
+                      <a:endParaRPr lang="es-ES" sz="1200" dirty="0"/>
+                    </a:p>
+                  </a:txBody>
+                  <a:tcPr anchor="ctr"/>
+                </a:tc>
+                <a:tc gridSpan="2">
+                  <a:txBody>
+                    <a:bodyPr/>
+                    <a:lstStyle/>
+                    <a:p>
+                      <a:pPr algn="ctr"/>
+                      <a:r>
+                        <a:rPr lang="es-ES" sz="1200" dirty="0" smtClean="0"/>
+                        <a:t>GND</a:t>
+                      </a:r>
+                      <a:endParaRPr lang="es-ES" sz="1200" dirty="0"/>
+                    </a:p>
+                  </a:txBody>
+                  <a:tcPr anchor="ctr"/>
+                </a:tc>
+                <a:tc hMerge="1">
+                  <a:txBody>
+                    <a:bodyPr/>
+                    <a:lstStyle/>
+                    <a:p>
+                      <a:pPr algn="ctr"/>
                       <a:endParaRPr lang="es-ES" sz="1200" dirty="0"/>
                     </a:p>
                   </a:txBody>
@@ -4900,38 +5131,6 @@
                       <a:pPr algn="ctr"/>
                       <a:r>
                         <a:rPr lang="es-ES" sz="1200" dirty="0" smtClean="0"/>
-                        <a:t>13</a:t>
-                      </a:r>
-                      <a:endParaRPr lang="es-ES" sz="1200" dirty="0"/>
-                    </a:p>
-                  </a:txBody>
-                  <a:tcPr anchor="ctr"/>
-                </a:tc>
-                <a:tc>
-                  <a:txBody>
-                    <a:bodyPr/>
-                    <a:lstStyle/>
-                    <a:p>
-                      <a:pPr algn="ctr"/>
-                      <a:r>
-                        <a:rPr lang="es-ES" sz="1200" dirty="0" smtClean="0"/>
-                        <a:t>GND</a:t>
-                      </a:r>
-                      <a:endParaRPr lang="es-ES" sz="1200" dirty="0"/>
-                    </a:p>
-                  </a:txBody>
-                  <a:tcPr anchor="ctr"/>
-                </a:tc>
-              </a:tr>
-              <a:tr h="216000">
-                <a:tc>
-                  <a:txBody>
-                    <a:bodyPr/>
-                    <a:lstStyle/>
-                    <a:p>
-                      <a:pPr algn="ctr"/>
-                      <a:r>
-                        <a:rPr lang="es-ES" sz="1200" dirty="0" smtClean="0"/>
                         <a:t>14</a:t>
                       </a:r>
                       <a:endParaRPr lang="es-ES" sz="1200" dirty="0"/>
@@ -4939,7 +5138,7 @@
                   </a:txBody>
                   <a:tcPr anchor="ctr"/>
                 </a:tc>
-                <a:tc>
+                <a:tc gridSpan="2">
                   <a:txBody>
                     <a:bodyPr/>
                     <a:lstStyle/>
@@ -4949,6 +5148,17 @@
                         <a:rPr lang="es-ES" sz="1200" dirty="0" smtClean="0"/>
                         <a:t>+5V</a:t>
                       </a:r>
+                      <a:endParaRPr lang="es-ES" sz="1200" dirty="0"/>
+                    </a:p>
+                  </a:txBody>
+                  <a:tcPr anchor="ctr"/>
+                </a:tc>
+                <a:tc hMerge="1">
+                  <a:txBody>
+                    <a:bodyPr/>
+                    <a:lstStyle/>
+                    <a:p>
+                      <a:pPr algn="ctr"/>
                       <a:endParaRPr lang="es-ES" sz="1200" dirty="0"/>
                     </a:p>
                   </a:txBody>
@@ -4968,13 +5178,13 @@
           <p:nvPr>
             <p:extLst>
               <p:ext uri="{D42A27DB-BD31-4B8C-83A1-F6EECF244321}">
-                <p14:modId xmlns:p14="http://schemas.microsoft.com/office/powerpoint/2010/main" val="1168136833"/>
+                <p14:modId xmlns:p14="http://schemas.microsoft.com/office/powerpoint/2010/main" val="4279473758"/>
               </p:ext>
             </p:extLst>
           </p:nvPr>
         </p:nvGraphicFramePr>
         <p:xfrm>
-          <a:off x="5868144" y="1956372"/>
+          <a:off x="5004048" y="1956372"/>
           <a:ext cx="1152000" cy="1371600"/>
         </p:xfrm>
         <a:graphic>
@@ -5155,13 +5365,13 @@
           <p:nvPr>
             <p:extLst>
               <p:ext uri="{D42A27DB-BD31-4B8C-83A1-F6EECF244321}">
-                <p14:modId xmlns:p14="http://schemas.microsoft.com/office/powerpoint/2010/main" val="2007503929"/>
+                <p14:modId xmlns:p14="http://schemas.microsoft.com/office/powerpoint/2010/main" val="610627598"/>
               </p:ext>
             </p:extLst>
           </p:nvPr>
         </p:nvGraphicFramePr>
         <p:xfrm>
-          <a:off x="5868144" y="3492130"/>
+          <a:off x="5004048" y="3492130"/>
           <a:ext cx="1152000" cy="1097280"/>
         </p:xfrm>
         <a:graphic>
@@ -5310,13 +5520,13 @@
           <p:nvPr>
             <p:extLst>
               <p:ext uri="{D42A27DB-BD31-4B8C-83A1-F6EECF244321}">
-                <p14:modId xmlns:p14="http://schemas.microsoft.com/office/powerpoint/2010/main" val="3592792963"/>
+                <p14:modId xmlns:p14="http://schemas.microsoft.com/office/powerpoint/2010/main" val="2492734301"/>
               </p:ext>
             </p:extLst>
           </p:nvPr>
         </p:nvGraphicFramePr>
         <p:xfrm>
-          <a:off x="5868144" y="4807416"/>
+          <a:off x="5004048" y="4807416"/>
           <a:ext cx="1152000" cy="1645920"/>
         </p:xfrm>
         <a:graphic>
@@ -5528,7 +5738,7 @@
         </p:nvSpPr>
         <p:spPr>
           <a:xfrm>
-            <a:off x="2476941" y="2195572"/>
+            <a:off x="1972885" y="2195572"/>
             <a:ext cx="301686" cy="369332"/>
           </a:xfrm>
           <a:prstGeom prst="rect">
@@ -5558,7 +5768,7 @@
         </p:nvSpPr>
         <p:spPr>
           <a:xfrm>
-            <a:off x="748749" y="2195572"/>
+            <a:off x="244693" y="2195572"/>
             <a:ext cx="301686" cy="369332"/>
           </a:xfrm>
           <a:prstGeom prst="rect">
@@ -5588,7 +5798,7 @@
         </p:nvSpPr>
         <p:spPr>
           <a:xfrm>
-            <a:off x="2888910" y="2556115"/>
+            <a:off x="2384854" y="2556115"/>
             <a:ext cx="136508" cy="162018"/>
           </a:xfrm>
           <a:prstGeom prst="rect">
@@ -5634,7 +5844,7 @@
         </p:nvSpPr>
         <p:spPr>
           <a:xfrm>
-            <a:off x="3949338" y="1710204"/>
+            <a:off x="3445282" y="1710204"/>
             <a:ext cx="1548886" cy="369332"/>
           </a:xfrm>
           <a:prstGeom prst="rect">
@@ -5664,7 +5874,7 @@
         </p:nvCxnSpPr>
         <p:spPr>
           <a:xfrm flipV="1">
-            <a:off x="2951820" y="2079536"/>
+            <a:off x="2447764" y="2079536"/>
             <a:ext cx="1039029" cy="557667"/>
           </a:xfrm>
           <a:prstGeom prst="curvedConnector2">
@@ -5699,7 +5909,7 @@
         </p:nvSpPr>
         <p:spPr>
           <a:xfrm>
-            <a:off x="2752551" y="2556115"/>
+            <a:off x="2248495" y="2556115"/>
             <a:ext cx="136508" cy="162018"/>
           </a:xfrm>
           <a:prstGeom prst="rect">

</xml_diff>

<commit_message>
Diseño PCB, código test, placa
</commit_message>
<xml_diff>
--- a/proteus/placa_text.pptx
+++ b/proteus/placa_text.pptx
@@ -288,7 +288,7 @@
           <a:p>
             <a:fld id="{491D21B5-2E6D-497E-862F-D64FC10119C2}" type="datetimeFigureOut">
               <a:rPr lang="es-ES" smtClean="0"/>
-              <a:t>31/10/2022</a:t>
+              <a:t>07/11/2022</a:t>
             </a:fld>
             <a:endParaRPr lang="es-ES"/>
           </a:p>
@@ -458,7 +458,7 @@
           <a:p>
             <a:fld id="{491D21B5-2E6D-497E-862F-D64FC10119C2}" type="datetimeFigureOut">
               <a:rPr lang="es-ES" smtClean="0"/>
-              <a:t>31/10/2022</a:t>
+              <a:t>07/11/2022</a:t>
             </a:fld>
             <a:endParaRPr lang="es-ES"/>
           </a:p>
@@ -638,7 +638,7 @@
           <a:p>
             <a:fld id="{491D21B5-2E6D-497E-862F-D64FC10119C2}" type="datetimeFigureOut">
               <a:rPr lang="es-ES" smtClean="0"/>
-              <a:t>31/10/2022</a:t>
+              <a:t>07/11/2022</a:t>
             </a:fld>
             <a:endParaRPr lang="es-ES"/>
           </a:p>
@@ -808,7 +808,7 @@
           <a:p>
             <a:fld id="{491D21B5-2E6D-497E-862F-D64FC10119C2}" type="datetimeFigureOut">
               <a:rPr lang="es-ES" smtClean="0"/>
-              <a:t>31/10/2022</a:t>
+              <a:t>07/11/2022</a:t>
             </a:fld>
             <a:endParaRPr lang="es-ES"/>
           </a:p>
@@ -1054,7 +1054,7 @@
           <a:p>
             <a:fld id="{491D21B5-2E6D-497E-862F-D64FC10119C2}" type="datetimeFigureOut">
               <a:rPr lang="es-ES" smtClean="0"/>
-              <a:t>31/10/2022</a:t>
+              <a:t>07/11/2022</a:t>
             </a:fld>
             <a:endParaRPr lang="es-ES"/>
           </a:p>
@@ -1342,7 +1342,7 @@
           <a:p>
             <a:fld id="{491D21B5-2E6D-497E-862F-D64FC10119C2}" type="datetimeFigureOut">
               <a:rPr lang="es-ES" smtClean="0"/>
-              <a:t>31/10/2022</a:t>
+              <a:t>07/11/2022</a:t>
             </a:fld>
             <a:endParaRPr lang="es-ES"/>
           </a:p>
@@ -1764,7 +1764,7 @@
           <a:p>
             <a:fld id="{491D21B5-2E6D-497E-862F-D64FC10119C2}" type="datetimeFigureOut">
               <a:rPr lang="es-ES" smtClean="0"/>
-              <a:t>31/10/2022</a:t>
+              <a:t>07/11/2022</a:t>
             </a:fld>
             <a:endParaRPr lang="es-ES"/>
           </a:p>
@@ -1882,7 +1882,7 @@
           <a:p>
             <a:fld id="{491D21B5-2E6D-497E-862F-D64FC10119C2}" type="datetimeFigureOut">
               <a:rPr lang="es-ES" smtClean="0"/>
-              <a:t>31/10/2022</a:t>
+              <a:t>07/11/2022</a:t>
             </a:fld>
             <a:endParaRPr lang="es-ES"/>
           </a:p>
@@ -1977,7 +1977,7 @@
           <a:p>
             <a:fld id="{491D21B5-2E6D-497E-862F-D64FC10119C2}" type="datetimeFigureOut">
               <a:rPr lang="es-ES" smtClean="0"/>
-              <a:t>31/10/2022</a:t>
+              <a:t>07/11/2022</a:t>
             </a:fld>
             <a:endParaRPr lang="es-ES"/>
           </a:p>
@@ -2254,7 +2254,7 @@
           <a:p>
             <a:fld id="{491D21B5-2E6D-497E-862F-D64FC10119C2}" type="datetimeFigureOut">
               <a:rPr lang="es-ES" smtClean="0"/>
-              <a:t>31/10/2022</a:t>
+              <a:t>07/11/2022</a:t>
             </a:fld>
             <a:endParaRPr lang="es-ES"/>
           </a:p>
@@ -2507,7 +2507,7 @@
           <a:p>
             <a:fld id="{491D21B5-2E6D-497E-862F-D64FC10119C2}" type="datetimeFigureOut">
               <a:rPr lang="es-ES" smtClean="0"/>
-              <a:t>31/10/2022</a:t>
+              <a:t>07/11/2022</a:t>
             </a:fld>
             <a:endParaRPr lang="es-ES"/>
           </a:p>
@@ -2720,7 +2720,7 @@
           <a:p>
             <a:fld id="{491D21B5-2E6D-497E-862F-D64FC10119C2}" type="datetimeFigureOut">
               <a:rPr lang="es-ES" smtClean="0"/>
-              <a:t>31/10/2022</a:t>
+              <a:t>07/11/2022</a:t>
             </a:fld>
             <a:endParaRPr lang="es-ES"/>
           </a:p>
@@ -4461,7 +4461,7 @@
           <p:nvPr>
             <p:extLst>
               <p:ext uri="{D42A27DB-BD31-4B8C-83A1-F6EECF244321}">
-                <p14:modId xmlns:p14="http://schemas.microsoft.com/office/powerpoint/2010/main" val="2151227145"/>
+                <p14:modId xmlns:p14="http://schemas.microsoft.com/office/powerpoint/2010/main" val="2520738866"/>
               </p:ext>
             </p:extLst>
           </p:nvPr>
@@ -4543,7 +4543,7 @@
                       <a:pPr algn="ctr"/>
                       <a:r>
                         <a:rPr lang="es-ES" sz="1200" dirty="0" smtClean="0"/>
-                        <a:t>LCD2</a:t>
+                        <a:t>GPIO5</a:t>
                       </a:r>
                       <a:endParaRPr lang="es-ES" sz="1200" dirty="0"/>
                     </a:p>
@@ -4637,7 +4637,7 @@
                       <a:pPr algn="ctr"/>
                       <a:r>
                         <a:rPr lang="es-ES" sz="1200" dirty="0" smtClean="0"/>
-                        <a:t>GPIO1</a:t>
+                        <a:t>GPIO7</a:t>
                       </a:r>
                       <a:endParaRPr lang="es-ES" sz="1200" dirty="0"/>
                     </a:p>
@@ -4731,7 +4731,7 @@
                       <a:pPr algn="ctr"/>
                       <a:r>
                         <a:rPr lang="es-ES" sz="1200" dirty="0" smtClean="0"/>
-                        <a:t>GPIO5</a:t>
+                        <a:t>GPIO1</a:t>
                       </a:r>
                       <a:endParaRPr lang="es-ES" sz="1200" dirty="0"/>
                     </a:p>
@@ -4778,7 +4778,7 @@
                       <a:pPr algn="ctr"/>
                       <a:r>
                         <a:rPr lang="es-ES" sz="1200" dirty="0" smtClean="0"/>
-                        <a:t>GPIO7</a:t>
+                        <a:t>GPIO8</a:t>
                       </a:r>
                       <a:endParaRPr lang="es-ES" sz="1200" dirty="0"/>
                     </a:p>
@@ -4825,7 +4825,7 @@
                       <a:pPr algn="ctr"/>
                       <a:r>
                         <a:rPr lang="es-ES" sz="1200" dirty="0" smtClean="0"/>
-                        <a:t>GPIO8</a:t>
+                        <a:t>TCOL0</a:t>
                       </a:r>
                       <a:endParaRPr lang="es-ES" sz="1200" dirty="0"/>
                     </a:p>
@@ -4919,7 +4919,7 @@
                       <a:pPr algn="ctr"/>
                       <a:r>
                         <a:rPr lang="es-ES" sz="1200" dirty="0" smtClean="0"/>
-                        <a:t>GPIO2</a:t>
+                        <a:t>GPIO4</a:t>
                       </a:r>
                       <a:endParaRPr lang="es-ES" sz="1200" dirty="0"/>
                     </a:p>
@@ -4965,8 +4965,8 @@
                     <a:p>
                       <a:pPr algn="ctr"/>
                       <a:r>
-                        <a:rPr lang="es-ES" sz="1200" dirty="0" smtClean="0"/>
-                        <a:t>GPIO4</a:t>
+                        <a:rPr lang="es-ES" sz="1200" smtClean="0"/>
+                        <a:t>LCD2</a:t>
                       </a:r>
                       <a:endParaRPr lang="es-ES" sz="1200" dirty="0"/>
                     </a:p>

</xml_diff>